<commit_message>
updated title slide deck
</commit_message>
<xml_diff>
--- a/DSCPullWS.pptx
+++ b/DSCPullWS.pptx
@@ -8,7 +8,7 @@
     <p:notesMasterId r:id="rId9"/>
   </p:notesMasterIdLst>
   <p:sldIdLst>
-    <p:sldId id="260" r:id="rId2"/>
+    <p:sldId id="273" r:id="rId2"/>
     <p:sldId id="279" r:id="rId3"/>
     <p:sldId id="282" r:id="rId4"/>
     <p:sldId id="291" r:id="rId5"/>
@@ -202,7 +202,7 @@
           </a:lstStyle>
           <a:p>
             <a:fld id="{811A311C-DD8B-164B-A5B4-891FB44DF03B}" type="datetimeFigureOut">
-              <a:t>9/11/2018</a:t>
+              <a:t>9/26/2018</a:t>
             </a:fld>
             <a:endParaRPr lang="en-US"/>
           </a:p>
@@ -512,7 +512,7 @@
           <a:bodyPr/>
           <a:lstStyle/>
           <a:p>
-            <a:endParaRPr lang="en-US"/>
+            <a:endParaRPr lang="en-US" dirty="0"/>
           </a:p>
         </p:txBody>
       </p:sp>
@@ -523,7 +523,7 @@
             <a:spLocks noGrp="1"/>
           </p:cNvSpPr>
           <p:nvPr>
-            <p:ph type="sldNum" sz="quarter" idx="10"/>
+            <p:ph type="sldNum" sz="quarter" idx="5"/>
           </p:nvPr>
         </p:nvSpPr>
         <p:spPr/>
@@ -532,7 +532,8 @@
           <a:lstStyle/>
           <a:p>
             <a:fld id="{1184D872-AB72-7141-BB7A-B591141434CC}" type="slidenum">
-              <a:t>1</a:t>
+              <a:rPr lang="en-US" smtClean="0"/>
+              <a:t>2</a:t>
             </a:fld>
             <a:endParaRPr lang="en-US"/>
           </a:p>
@@ -541,7 +542,7 @@
     </p:spTree>
     <p:extLst>
       <p:ext uri="{BB962C8B-B14F-4D97-AF65-F5344CB8AC3E}">
-        <p14:creationId xmlns:p14="http://schemas.microsoft.com/office/powerpoint/2010/main" val="193563925"/>
+        <p14:creationId xmlns:p14="http://schemas.microsoft.com/office/powerpoint/2010/main" val="1224247964"/>
       </p:ext>
     </p:extLst>
   </p:cSld>
@@ -595,7 +596,53 @@
           <a:bodyPr/>
           <a:lstStyle/>
           <a:p>
+            <a:r>
+              <a:rPr lang="en-US" dirty="0"/>
+              <a:t>1 hour workshop</a:t>
+            </a:r>
+          </a:p>
+          <a:p>
+            <a:r>
+              <a:rPr lang="en-US" dirty="0"/>
+              <a:t>Assumption that </a:t>
+            </a:r>
+            <a:r>
+              <a:rPr lang="en-US" dirty="0" err="1"/>
+              <a:t>dsc</a:t>
+            </a:r>
+            <a:r>
+              <a:rPr lang="en-US" dirty="0"/>
+              <a:t> concepts are not a mystery anymore (will very quickly explain basics during discussion on configuration modes)</a:t>
+            </a:r>
+          </a:p>
+          <a:p>
             <a:endParaRPr lang="en-US" dirty="0"/>
+          </a:p>
+          <a:p>
+            <a:r>
+              <a:rPr lang="en-US" dirty="0"/>
+              <a:t>Requirements to follow along:</a:t>
+            </a:r>
+          </a:p>
+          <a:p>
+            <a:pPr marL="171450" indent="-171450">
+              <a:buFont typeface="Arial" panose="020B0604020202020204" pitchFamily="34" charset="0"/>
+              <a:buChar char="•"/>
+            </a:pPr>
+            <a:r>
+              <a:rPr lang="en-US" dirty="0"/>
+              <a:t>1 VM Windows Server 2019 with SQL Express installed</a:t>
+            </a:r>
+          </a:p>
+          <a:p>
+            <a:pPr marL="171450" indent="-171450">
+              <a:buFont typeface="Arial" panose="020B0604020202020204" pitchFamily="34" charset="0"/>
+              <a:buChar char="•"/>
+            </a:pPr>
+            <a:r>
+              <a:rPr lang="en-US" dirty="0"/>
+              <a:t>1 VM Windows Server 2016 / 2019</a:t>
+            </a:r>
           </a:p>
         </p:txBody>
       </p:sp>
@@ -616,7 +663,7 @@
           <a:p>
             <a:fld id="{1184D872-AB72-7141-BB7A-B591141434CC}" type="slidenum">
               <a:rPr lang="en-US" smtClean="0"/>
-              <a:t>2</a:t>
+              <a:t>3</a:t>
             </a:fld>
             <a:endParaRPr lang="en-US"/>
           </a:p>
@@ -625,7 +672,7 @@
     </p:spTree>
     <p:extLst>
       <p:ext uri="{BB962C8B-B14F-4D97-AF65-F5344CB8AC3E}">
-        <p14:creationId xmlns:p14="http://schemas.microsoft.com/office/powerpoint/2010/main" val="1224247964"/>
+        <p14:creationId xmlns:p14="http://schemas.microsoft.com/office/powerpoint/2010/main" val="2248944628"/>
       </p:ext>
     </p:extLst>
   </p:cSld>
@@ -679,136 +726,6 @@
           <a:bodyPr/>
           <a:lstStyle/>
           <a:p>
-            <a:r>
-              <a:rPr lang="en-US" dirty="0"/>
-              <a:t>1 hour workshop</a:t>
-            </a:r>
-          </a:p>
-          <a:p>
-            <a:r>
-              <a:rPr lang="en-US" dirty="0"/>
-              <a:t>Assumption that </a:t>
-            </a:r>
-            <a:r>
-              <a:rPr lang="en-US" dirty="0" err="1"/>
-              <a:t>dsc</a:t>
-            </a:r>
-            <a:r>
-              <a:rPr lang="en-US" dirty="0"/>
-              <a:t> concepts are not a mystery anymore (will very quickly explain basics during discussion on configuration modes)</a:t>
-            </a:r>
-          </a:p>
-          <a:p>
-            <a:endParaRPr lang="en-US" dirty="0"/>
-          </a:p>
-          <a:p>
-            <a:r>
-              <a:rPr lang="en-US" dirty="0"/>
-              <a:t>Requirements to follow along:</a:t>
-            </a:r>
-          </a:p>
-          <a:p>
-            <a:pPr marL="171450" indent="-171450">
-              <a:buFont typeface="Arial" panose="020B0604020202020204" pitchFamily="34" charset="0"/>
-              <a:buChar char="•"/>
-            </a:pPr>
-            <a:r>
-              <a:rPr lang="en-US" dirty="0"/>
-              <a:t>1 VM Windows Server 2019 with SQL Express installed</a:t>
-            </a:r>
-          </a:p>
-          <a:p>
-            <a:pPr marL="171450" indent="-171450">
-              <a:buFont typeface="Arial" panose="020B0604020202020204" pitchFamily="34" charset="0"/>
-              <a:buChar char="•"/>
-            </a:pPr>
-            <a:r>
-              <a:rPr lang="en-US" dirty="0"/>
-              <a:t>1 VM Windows Server 2016 / 2019</a:t>
-            </a:r>
-          </a:p>
-        </p:txBody>
-      </p:sp>
-      <p:sp>
-        <p:nvSpPr>
-          <p:cNvPr id="4" name="Slide Number Placeholder 3"/>
-          <p:cNvSpPr>
-            <a:spLocks noGrp="1"/>
-          </p:cNvSpPr>
-          <p:nvPr>
-            <p:ph type="sldNum" sz="quarter" idx="5"/>
-          </p:nvPr>
-        </p:nvSpPr>
-        <p:spPr/>
-        <p:txBody>
-          <a:bodyPr/>
-          <a:lstStyle/>
-          <a:p>
-            <a:fld id="{1184D872-AB72-7141-BB7A-B591141434CC}" type="slidenum">
-              <a:rPr lang="en-US" smtClean="0"/>
-              <a:t>3</a:t>
-            </a:fld>
-            <a:endParaRPr lang="en-US"/>
-          </a:p>
-        </p:txBody>
-      </p:sp>
-    </p:spTree>
-    <p:extLst>
-      <p:ext uri="{BB962C8B-B14F-4D97-AF65-F5344CB8AC3E}">
-        <p14:creationId xmlns:p14="http://schemas.microsoft.com/office/powerpoint/2010/main" val="2248944628"/>
-      </p:ext>
-    </p:extLst>
-  </p:cSld>
-  <p:clrMapOvr>
-    <a:masterClrMapping/>
-  </p:clrMapOvr>
-</p:notes>
-</file>
-
-<file path=ppt/notesSlides/notesSlide4.xml><?xml version="1.0" encoding="utf-8"?>
-<p:notes xmlns:a="http://schemas.openxmlformats.org/drawingml/2006/main" xmlns:r="http://schemas.openxmlformats.org/officeDocument/2006/relationships" xmlns:p="http://schemas.openxmlformats.org/presentationml/2006/main">
-  <p:cSld>
-    <p:spTree>
-      <p:nvGrpSpPr>
-        <p:cNvPr id="1" name=""/>
-        <p:cNvGrpSpPr/>
-        <p:nvPr/>
-      </p:nvGrpSpPr>
-      <p:grpSpPr>
-        <a:xfrm>
-          <a:off x="0" y="0"/>
-          <a:ext cx="0" cy="0"/>
-          <a:chOff x="0" y="0"/>
-          <a:chExt cx="0" cy="0"/>
-        </a:xfrm>
-      </p:grpSpPr>
-      <p:sp>
-        <p:nvSpPr>
-          <p:cNvPr id="2" name="Slide Image Placeholder 1"/>
-          <p:cNvSpPr>
-            <a:spLocks noGrp="1" noRot="1" noChangeAspect="1"/>
-          </p:cNvSpPr>
-          <p:nvPr>
-            <p:ph type="sldImg"/>
-          </p:nvPr>
-        </p:nvSpPr>
-        <p:spPr/>
-      </p:sp>
-      <p:sp>
-        <p:nvSpPr>
-          <p:cNvPr id="3" name="Notes Placeholder 2"/>
-          <p:cNvSpPr>
-            <a:spLocks noGrp="1"/>
-          </p:cNvSpPr>
-          <p:nvPr>
-            <p:ph type="body" idx="1"/>
-          </p:nvPr>
-        </p:nvSpPr>
-        <p:spPr/>
-        <p:txBody>
-          <a:bodyPr/>
-          <a:lstStyle/>
-          <a:p>
             <a:endParaRPr lang="en-US" dirty="0"/>
           </a:p>
         </p:txBody>
@@ -849,7 +766,7 @@
 </p:notes>
 </file>
 
-<file path=ppt/notesSlides/notesSlide5.xml><?xml version="1.0" encoding="utf-8"?>
+<file path=ppt/notesSlides/notesSlide4.xml><?xml version="1.0" encoding="utf-8"?>
 <p:notes xmlns:a="http://schemas.openxmlformats.org/drawingml/2006/main" xmlns:r="http://schemas.openxmlformats.org/officeDocument/2006/relationships" xmlns:p="http://schemas.openxmlformats.org/presentationml/2006/main">
   <p:cSld>
     <p:spTree>
@@ -1062,7 +979,7 @@
           <a:p>
             <a:fld id="{99585AEA-614B-7045-B3D9-61FEC86204D9}" type="datetimeFigureOut">
               <a:rPr lang="en-US" smtClean="0"/>
-              <a:t>9/11/2018</a:t>
+              <a:t>9/26/2018</a:t>
             </a:fld>
             <a:endParaRPr lang="en-US"/>
           </a:p>
@@ -1230,7 +1147,7 @@
           <a:p>
             <a:fld id="{99585AEA-614B-7045-B3D9-61FEC86204D9}" type="datetimeFigureOut">
               <a:rPr lang="en-US" smtClean="0"/>
-              <a:t>9/11/2018</a:t>
+              <a:t>9/26/2018</a:t>
             </a:fld>
             <a:endParaRPr lang="en-US"/>
           </a:p>
@@ -1408,7 +1325,7 @@
           <a:p>
             <a:fld id="{99585AEA-614B-7045-B3D9-61FEC86204D9}" type="datetimeFigureOut">
               <a:rPr lang="en-US" smtClean="0"/>
-              <a:t>9/11/2018</a:t>
+              <a:t>9/26/2018</a:t>
             </a:fld>
             <a:endParaRPr lang="en-US"/>
           </a:p>
@@ -1576,7 +1493,7 @@
           <a:p>
             <a:fld id="{99585AEA-614B-7045-B3D9-61FEC86204D9}" type="datetimeFigureOut">
               <a:rPr lang="en-US" smtClean="0"/>
-              <a:t>9/11/2018</a:t>
+              <a:t>9/26/2018</a:t>
             </a:fld>
             <a:endParaRPr lang="en-US"/>
           </a:p>
@@ -1821,7 +1738,7 @@
           <a:p>
             <a:fld id="{99585AEA-614B-7045-B3D9-61FEC86204D9}" type="datetimeFigureOut">
               <a:rPr lang="en-US" smtClean="0"/>
-              <a:t>9/11/2018</a:t>
+              <a:t>9/26/2018</a:t>
             </a:fld>
             <a:endParaRPr lang="en-US"/>
           </a:p>
@@ -2050,7 +1967,7 @@
           <a:p>
             <a:fld id="{99585AEA-614B-7045-B3D9-61FEC86204D9}" type="datetimeFigureOut">
               <a:rPr lang="en-US" smtClean="0"/>
-              <a:t>9/11/2018</a:t>
+              <a:t>9/26/2018</a:t>
             </a:fld>
             <a:endParaRPr lang="en-US"/>
           </a:p>
@@ -2414,7 +2331,7 @@
           <a:p>
             <a:fld id="{99585AEA-614B-7045-B3D9-61FEC86204D9}" type="datetimeFigureOut">
               <a:rPr lang="en-US" smtClean="0"/>
-              <a:t>9/11/2018</a:t>
+              <a:t>9/26/2018</a:t>
             </a:fld>
             <a:endParaRPr lang="en-US"/>
           </a:p>
@@ -2531,7 +2448,7 @@
           <a:p>
             <a:fld id="{99585AEA-614B-7045-B3D9-61FEC86204D9}" type="datetimeFigureOut">
               <a:rPr lang="en-US" smtClean="0"/>
-              <a:t>9/11/2018</a:t>
+              <a:t>9/26/2018</a:t>
             </a:fld>
             <a:endParaRPr lang="en-US"/>
           </a:p>
@@ -2626,7 +2543,7 @@
           <a:p>
             <a:fld id="{99585AEA-614B-7045-B3D9-61FEC86204D9}" type="datetimeFigureOut">
               <a:rPr lang="en-US" smtClean="0"/>
-              <a:t>9/11/2018</a:t>
+              <a:t>9/26/2018</a:t>
             </a:fld>
             <a:endParaRPr lang="en-US"/>
           </a:p>
@@ -2901,7 +2818,7 @@
           <a:p>
             <a:fld id="{99585AEA-614B-7045-B3D9-61FEC86204D9}" type="datetimeFigureOut">
               <a:rPr lang="en-US" smtClean="0"/>
-              <a:t>9/11/2018</a:t>
+              <a:t>9/26/2018</a:t>
             </a:fld>
             <a:endParaRPr lang="en-US"/>
           </a:p>
@@ -3153,7 +3070,7 @@
           <a:p>
             <a:fld id="{99585AEA-614B-7045-B3D9-61FEC86204D9}" type="datetimeFigureOut">
               <a:rPr lang="en-US" smtClean="0"/>
-              <a:t>9/11/2018</a:t>
+              <a:t>9/26/2018</a:t>
             </a:fld>
             <a:endParaRPr lang="en-US"/>
           </a:p>
@@ -3364,7 +3281,7 @@
           <a:p>
             <a:fld id="{99585AEA-614B-7045-B3D9-61FEC86204D9}" type="datetimeFigureOut">
               <a:rPr lang="en-US" smtClean="0"/>
-              <a:t>9/11/2018</a:t>
+              <a:t>9/26/2018</a:t>
             </a:fld>
             <a:endParaRPr lang="en-US"/>
           </a:p>
@@ -3755,16 +3672,6 @@
 <file path=ppt/slides/slide1.xml><?xml version="1.0" encoding="utf-8"?>
 <p:sld xmlns:a="http://schemas.openxmlformats.org/drawingml/2006/main" xmlns:r="http://schemas.openxmlformats.org/officeDocument/2006/relationships" xmlns:p="http://schemas.openxmlformats.org/presentationml/2006/main">
   <p:cSld>
-    <p:bg>
-      <p:bgPr>
-        <a:solidFill>
-          <a:schemeClr val="bg1">
-            <a:alpha val="7000"/>
-          </a:schemeClr>
-        </a:solidFill>
-        <a:effectLst/>
-      </p:bgPr>
-    </p:bg>
     <p:spTree>
       <p:nvGrpSpPr>
         <p:cNvPr id="1" name=""/>
@@ -3781,14 +3688,14 @@
       </p:grpSpPr>
       <p:pic>
         <p:nvPicPr>
-          <p:cNvPr id="4" name="Picture 3"/>
+          <p:cNvPr id="2" name="Picture 1"/>
           <p:cNvPicPr>
             <a:picLocks noChangeAspect="1"/>
           </p:cNvPicPr>
           <p:nvPr/>
         </p:nvPicPr>
         <p:blipFill rotWithShape="1">
-          <a:blip r:embed="rId3">
+          <a:blip r:embed="rId2">
             <a:extLst>
               <a:ext uri="{28A0092B-C50C-407E-A947-70E740481C1C}">
                 <a14:useLocalDpi xmlns:a14="http://schemas.microsoft.com/office/drawing/2010/main" val="0"/>
@@ -3800,8 +3707,8 @@
         </p:blipFill>
         <p:spPr>
           <a:xfrm>
-            <a:off x="0" y="-2"/>
-            <a:ext cx="12192000" cy="5731936"/>
+            <a:off x="0" y="0"/>
+            <a:ext cx="12192000" cy="5731934"/>
           </a:xfrm>
           <a:prstGeom prst="rect">
             <a:avLst/>
@@ -3810,7 +3717,7 @@
       </p:pic>
       <p:sp>
         <p:nvSpPr>
-          <p:cNvPr id="15" name="Rectangle 14"/>
+          <p:cNvPr id="10" name="Rectangle 9"/>
           <p:cNvSpPr/>
           <p:nvPr/>
         </p:nvSpPr>
@@ -3877,14 +3784,14 @@
       </p:sp>
       <p:pic>
         <p:nvPicPr>
-          <p:cNvPr id="10" name="Picture 9"/>
+          <p:cNvPr id="9" name="Picture 8"/>
           <p:cNvPicPr>
             <a:picLocks noChangeAspect="1"/>
           </p:cNvPicPr>
           <p:nvPr/>
         </p:nvPicPr>
         <p:blipFill rotWithShape="1">
-          <a:blip r:embed="rId4">
+          <a:blip r:embed="rId3">
             <a:clrChange>
               <a:clrFrom>
                 <a:srgbClr val="FFFFFF"/>
@@ -3924,7 +3831,49 @@
       </p:pic>
       <p:pic>
         <p:nvPicPr>
-          <p:cNvPr id="18" name="Picture 17"/>
+          <p:cNvPr id="11" name="Picture 10">
+            <a:extLst>
+              <a:ext uri="{FF2B5EF4-FFF2-40B4-BE49-F238E27FC236}">
+                <a16:creationId xmlns:a16="http://schemas.microsoft.com/office/drawing/2014/main" id="{7CAE1940-2737-1C4E-AF44-8458FBD52CBB}"/>
+              </a:ext>
+            </a:extLst>
+          </p:cNvPr>
+          <p:cNvPicPr>
+            <a:picLocks noChangeAspect="1"/>
+          </p:cNvPicPr>
+          <p:nvPr/>
+        </p:nvPicPr>
+        <p:blipFill>
+          <a:blip r:embed="rId4">
+            <a:extLst>
+              <a:ext uri="{28A0092B-C50C-407E-A947-70E740481C1C}">
+                <a14:useLocalDpi xmlns:a14="http://schemas.microsoft.com/office/drawing/2010/main" val="0"/>
+              </a:ext>
+            </a:extLst>
+          </a:blip>
+          <a:stretch>
+            <a:fillRect/>
+          </a:stretch>
+        </p:blipFill>
+        <p:spPr>
+          <a:xfrm>
+            <a:off x="201758" y="5805135"/>
+            <a:ext cx="614818" cy="964420"/>
+          </a:xfrm>
+          <a:prstGeom prst="rect">
+            <a:avLst/>
+          </a:prstGeom>
+        </p:spPr>
+      </p:pic>
+      <p:pic>
+        <p:nvPicPr>
+          <p:cNvPr id="12" name="Picture 11">
+            <a:extLst>
+              <a:ext uri="{FF2B5EF4-FFF2-40B4-BE49-F238E27FC236}">
+                <a16:creationId xmlns:a16="http://schemas.microsoft.com/office/drawing/2014/main" id="{6444D98F-6D91-BD4A-9CE1-A617F96A6F72}"/>
+              </a:ext>
+            </a:extLst>
+          </p:cNvPr>
           <p:cNvPicPr>
             <a:picLocks noChangeAspect="1"/>
           </p:cNvPicPr>
@@ -3938,7 +3887,7 @@
         </p:blipFill>
         <p:spPr>
           <a:xfrm>
-            <a:off x="3388672" y="6169589"/>
+            <a:off x="2786591" y="6124217"/>
             <a:ext cx="1503542" cy="320199"/>
           </a:xfrm>
           <a:prstGeom prst="rect">
@@ -3948,28 +3897,28 @@
       </p:pic>
       <p:pic>
         <p:nvPicPr>
-          <p:cNvPr id="19" name="Picture 18"/>
+          <p:cNvPr id="13" name="Picture 12" descr="A picture containing object&#10;&#10;Description generated with high confidence">
+            <a:extLst>
+              <a:ext uri="{FF2B5EF4-FFF2-40B4-BE49-F238E27FC236}">
+                <a16:creationId xmlns:a16="http://schemas.microsoft.com/office/drawing/2014/main" id="{6E10961E-CFA9-D147-A143-0CBF29B389B9}"/>
+              </a:ext>
+            </a:extLst>
+          </p:cNvPr>
           <p:cNvPicPr>
             <a:picLocks noChangeAspect="1"/>
           </p:cNvPicPr>
           <p:nvPr/>
         </p:nvPicPr>
         <p:blipFill>
-          <a:blip r:embed="rId6">
-            <a:extLst>
-              <a:ext uri="{28A0092B-C50C-407E-A947-70E740481C1C}">
-                <a14:useLocalDpi xmlns:a14="http://schemas.microsoft.com/office/drawing/2010/main" val="0"/>
-              </a:ext>
-            </a:extLst>
-          </a:blip>
+          <a:blip r:embed="rId6"/>
           <a:stretch>
             <a:fillRect/>
           </a:stretch>
         </p:blipFill>
         <p:spPr>
           <a:xfrm>
-            <a:off x="6528770" y="5969689"/>
-            <a:ext cx="1672721" cy="720000"/>
+            <a:off x="902147" y="6017617"/>
+            <a:ext cx="1695450" cy="533400"/>
           </a:xfrm>
           <a:prstGeom prst="rect">
             <a:avLst/>
@@ -3978,10 +3927,10 @@
       </p:pic>
       <p:pic>
         <p:nvPicPr>
-          <p:cNvPr id="20" name="Picture 19" descr="A picture containing object&#10;&#10;Description generated with high confidence">
+          <p:cNvPr id="14" name="Picture 13">
             <a:extLst>
               <a:ext uri="{FF2B5EF4-FFF2-40B4-BE49-F238E27FC236}">
-                <a16:creationId xmlns:a16="http://schemas.microsoft.com/office/drawing/2014/main" id="{4F1A41B8-3A75-4F09-94F1-326EB4FF4F25}"/>
+                <a16:creationId xmlns:a16="http://schemas.microsoft.com/office/drawing/2014/main" id="{0F6AFEE3-6715-D64D-A712-3BB8731B1A59}"/>
               </a:ext>
             </a:extLst>
           </p:cNvPr>
@@ -3998,8 +3947,8 @@
         </p:blipFill>
         <p:spPr>
           <a:xfrm>
-            <a:off x="9834794" y="5999905"/>
-            <a:ext cx="1695450" cy="533400"/>
+            <a:off x="10034697" y="5823361"/>
+            <a:ext cx="1561062" cy="260177"/>
           </a:xfrm>
           <a:prstGeom prst="rect">
             <a:avLst/>
@@ -4008,40 +3957,157 @@
       </p:pic>
       <p:pic>
         <p:nvPicPr>
-          <p:cNvPr id="21" name="Picture 20"/>
+          <p:cNvPr id="15" name="Picture 14">
+            <a:extLst>
+              <a:ext uri="{FF2B5EF4-FFF2-40B4-BE49-F238E27FC236}">
+                <a16:creationId xmlns:a16="http://schemas.microsoft.com/office/drawing/2014/main" id="{80E42862-DB88-6143-B1BC-9BBFD3FEF51F}"/>
+              </a:ext>
+            </a:extLst>
+          </p:cNvPr>
           <p:cNvPicPr>
             <a:picLocks noChangeAspect="1"/>
           </p:cNvPicPr>
           <p:nvPr/>
         </p:nvPicPr>
         <p:blipFill>
-          <a:blip r:embed="rId8">
-            <a:extLst>
-              <a:ext uri="{28A0092B-C50C-407E-A947-70E740481C1C}">
-                <a14:useLocalDpi xmlns:a14="http://schemas.microsoft.com/office/drawing/2010/main" val="0"/>
-              </a:ext>
-            </a:extLst>
-          </a:blip>
+          <a:blip r:embed="rId8"/>
           <a:stretch>
             <a:fillRect/>
           </a:stretch>
         </p:blipFill>
         <p:spPr>
           <a:xfrm>
-            <a:off x="805887" y="5813460"/>
-            <a:ext cx="946229" cy="1032456"/>
+            <a:off x="10207651" y="6293093"/>
+            <a:ext cx="1170550" cy="532068"/>
           </a:xfrm>
           <a:prstGeom prst="rect">
             <a:avLst/>
           </a:prstGeom>
         </p:spPr>
       </p:pic>
-      <p:sp>
-        <p:nvSpPr>
-          <p:cNvPr id="2" name="TextBox 1">
+      <p:pic>
+        <p:nvPicPr>
+          <p:cNvPr id="21" name="Picture 20">
             <a:extLst>
               <a:ext uri="{FF2B5EF4-FFF2-40B4-BE49-F238E27FC236}">
-                <a16:creationId xmlns:a16="http://schemas.microsoft.com/office/drawing/2014/main" id="{5993A001-755C-4FB1-95A4-5446CCB9D6CE}"/>
+                <a16:creationId xmlns:a16="http://schemas.microsoft.com/office/drawing/2014/main" id="{D23518C7-E186-D74F-8BD6-699C7914F900}"/>
+              </a:ext>
+            </a:extLst>
+          </p:cNvPr>
+          <p:cNvPicPr>
+            <a:picLocks noChangeAspect="1"/>
+          </p:cNvPicPr>
+          <p:nvPr/>
+        </p:nvPicPr>
+        <p:blipFill>
+          <a:blip r:embed="rId9"/>
+          <a:stretch>
+            <a:fillRect/>
+          </a:stretch>
+        </p:blipFill>
+        <p:spPr>
+          <a:xfrm>
+            <a:off x="10373885" y="6090674"/>
+            <a:ext cx="876567" cy="303427"/>
+          </a:xfrm>
+          <a:prstGeom prst="rect">
+            <a:avLst/>
+          </a:prstGeom>
+        </p:spPr>
+      </p:pic>
+      <p:pic>
+        <p:nvPicPr>
+          <p:cNvPr id="22" name="Picture 21">
+            <a:extLst>
+              <a:ext uri="{FF2B5EF4-FFF2-40B4-BE49-F238E27FC236}">
+                <a16:creationId xmlns:a16="http://schemas.microsoft.com/office/drawing/2014/main" id="{94DE750D-8213-E84F-8CB8-F2982033B784}"/>
+              </a:ext>
+            </a:extLst>
+          </p:cNvPr>
+          <p:cNvPicPr>
+            <a:picLocks noChangeAspect="1"/>
+          </p:cNvPicPr>
+          <p:nvPr/>
+        </p:nvPicPr>
+        <p:blipFill rotWithShape="1">
+          <a:blip r:embed="rId10"/>
+          <a:srcRect l="7592" t="26996" r="7408" b="26271"/>
+          <a:stretch/>
+        </p:blipFill>
+        <p:spPr>
+          <a:xfrm>
+            <a:off x="6079480" y="5970592"/>
+            <a:ext cx="2224576" cy="543589"/>
+          </a:xfrm>
+          <a:prstGeom prst="rect">
+            <a:avLst/>
+          </a:prstGeom>
+        </p:spPr>
+      </p:pic>
+      <p:pic>
+        <p:nvPicPr>
+          <p:cNvPr id="23" name="Picture 22">
+            <a:extLst>
+              <a:ext uri="{FF2B5EF4-FFF2-40B4-BE49-F238E27FC236}">
+                <a16:creationId xmlns:a16="http://schemas.microsoft.com/office/drawing/2014/main" id="{6EB810E9-78D5-FA42-BDF1-D9E9985F6222}"/>
+              </a:ext>
+            </a:extLst>
+          </p:cNvPr>
+          <p:cNvPicPr>
+            <a:picLocks noChangeAspect="1"/>
+          </p:cNvPicPr>
+          <p:nvPr/>
+        </p:nvPicPr>
+        <p:blipFill rotWithShape="1">
+          <a:blip r:embed="rId11"/>
+          <a:srcRect l="7738" t="19236" r="6803" b="30102"/>
+          <a:stretch/>
+        </p:blipFill>
+        <p:spPr>
+          <a:xfrm>
+            <a:off x="4426194" y="6106723"/>
+            <a:ext cx="1573718" cy="328136"/>
+          </a:xfrm>
+          <a:prstGeom prst="rect">
+            <a:avLst/>
+          </a:prstGeom>
+        </p:spPr>
+      </p:pic>
+      <p:pic>
+        <p:nvPicPr>
+          <p:cNvPr id="24" name="Picture 23">
+            <a:extLst>
+              <a:ext uri="{FF2B5EF4-FFF2-40B4-BE49-F238E27FC236}">
+                <a16:creationId xmlns:a16="http://schemas.microsoft.com/office/drawing/2014/main" id="{88D9D656-E80F-6A4B-9204-E83EE742FF95}"/>
+              </a:ext>
+            </a:extLst>
+          </p:cNvPr>
+          <p:cNvPicPr>
+            <a:picLocks noChangeAspect="1"/>
+          </p:cNvPicPr>
+          <p:nvPr/>
+        </p:nvPicPr>
+        <p:blipFill rotWithShape="1">
+          <a:blip r:embed="rId12"/>
+          <a:srcRect l="9884" t="17682" r="11563" b="19075"/>
+          <a:stretch/>
+        </p:blipFill>
+        <p:spPr>
+          <a:xfrm>
+            <a:off x="8383624" y="6053482"/>
+            <a:ext cx="1458437" cy="442758"/>
+          </a:xfrm>
+          <a:prstGeom prst="rect">
+            <a:avLst/>
+          </a:prstGeom>
+        </p:spPr>
+      </p:pic>
+      <p:sp>
+        <p:nvSpPr>
+          <p:cNvPr id="16" name="TextBox 15">
+            <a:extLst>
+              <a:ext uri="{FF2B5EF4-FFF2-40B4-BE49-F238E27FC236}">
+                <a16:creationId xmlns:a16="http://schemas.microsoft.com/office/drawing/2014/main" id="{46079773-AC31-4D09-AFDA-F943A9278DE3}"/>
               </a:ext>
             </a:extLst>
           </p:cNvPr>
@@ -4050,7 +4116,7 @@
         </p:nvSpPr>
         <p:spPr>
           <a:xfrm>
-            <a:off x="221943" y="3236946"/>
+            <a:off x="28576" y="1119480"/>
             <a:ext cx="11691890" cy="707886"/>
           </a:xfrm>
           <a:prstGeom prst="rect">
@@ -4078,7 +4144,7 @@
     </p:spTree>
     <p:extLst>
       <p:ext uri="{BB962C8B-B14F-4D97-AF65-F5344CB8AC3E}">
-        <p14:creationId xmlns:p14="http://schemas.microsoft.com/office/powerpoint/2010/main" val="297332740"/>
+        <p14:creationId xmlns:p14="http://schemas.microsoft.com/office/powerpoint/2010/main" val="530271365"/>
       </p:ext>
     </p:extLst>
   </p:cSld>

</xml_diff>